<commit_message>
Fix and add pdfs
</commit_message>
<xml_diff>
--- a/RepetitoriumGRNVSTag3.pptx
+++ b/RepetitoriumGRNVSTag3.pptx
@@ -9940,84 +9940,6 @@
               <a:t>, 21.9.2018</a:t>
             </a:r>
             <a:endParaRPr lang="de-DE" dirty="0"/>
-          </a:p>
-        </p:txBody>
-      </p:sp>
-      <p:sp>
-        <p:nvSpPr>
-          <p:cNvPr id="2" name="Textfeld 1">
-            <a:extLst>
-              <a:ext uri="{FF2B5EF4-FFF2-40B4-BE49-F238E27FC236}">
-                <a16:creationId xmlns:a16="http://schemas.microsoft.com/office/drawing/2014/main" id="{EE4FDF1E-F052-45DA-9201-1A650EF530F6}"/>
-              </a:ext>
-            </a:extLst>
-          </p:cNvPr>
-          <p:cNvSpPr txBox="1"/>
-          <p:nvPr/>
-        </p:nvSpPr>
-        <p:spPr>
-          <a:xfrm flipH="1">
-            <a:off x="154776" y="4687372"/>
-            <a:ext cx="4702449" cy="385811"/>
-          </a:xfrm>
-          <a:prstGeom prst="rect">
-            <a:avLst/>
-          </a:prstGeom>
-          <a:noFill/>
-        </p:spPr>
-        <p:txBody>
-          <a:bodyPr wrap="square" lIns="0" tIns="0" rIns="0" bIns="0" rtlCol="0">
-            <a:spAutoFit/>
-          </a:bodyPr>
-          <a:lstStyle/>
-          <a:p>
-            <a:pPr>
-              <a:lnSpc>
-                <a:spcPct val="114000"/>
-              </a:lnSpc>
-            </a:pPr>
-            <a:r>
-              <a:rPr lang="en-US" sz="2400" dirty="0">
-                <a:solidFill>
-                  <a:schemeClr val="bg1"/>
-                </a:solidFill>
-                <a:latin typeface="+mn-lt"/>
-              </a:rPr>
-              <a:t>Gruppe 2 </a:t>
-            </a:r>
-            <a:r>
-              <a:rPr lang="en-US" sz="2400" dirty="0" err="1">
-                <a:solidFill>
-                  <a:schemeClr val="bg1"/>
-                </a:solidFill>
-                <a:latin typeface="+mn-lt"/>
-              </a:rPr>
-              <a:t>findet</a:t>
-            </a:r>
-            <a:r>
-              <a:rPr lang="en-US" sz="2400" dirty="0">
-                <a:solidFill>
-                  <a:schemeClr val="bg1"/>
-                </a:solidFill>
-                <a:latin typeface="+mn-lt"/>
-              </a:rPr>
-              <a:t> in MW2050 </a:t>
-            </a:r>
-            <a:r>
-              <a:rPr lang="en-US" sz="2400" dirty="0" err="1">
-                <a:solidFill>
-                  <a:schemeClr val="bg1"/>
-                </a:solidFill>
-                <a:latin typeface="+mn-lt"/>
-              </a:rPr>
-              <a:t>statt</a:t>
-            </a:r>
-            <a:endParaRPr lang="de-DE" sz="2400" dirty="0" err="1">
-              <a:solidFill>
-                <a:schemeClr val="bg1"/>
-              </a:solidFill>
-              <a:latin typeface="+mn-lt"/>
-            </a:endParaRPr>
           </a:p>
         </p:txBody>
       </p:sp>

</xml_diff>